<commit_message>
added title and sponsor slides
</commit_message>
<xml_diff>
--- a/ASP.NET MVC/TechThrowdown.pptx
+++ b/ASP.NET MVC/TechThrowdown.pptx
@@ -5,16 +5,18 @@
     <p:sldMasterId id="2147483720" r:id="rId1"/>
   </p:sldMasterIdLst>
   <p:notesMasterIdLst>
-    <p:notesMasterId r:id="rId6"/>
+    <p:notesMasterId r:id="rId8"/>
   </p:notesMasterIdLst>
   <p:sldIdLst>
-    <p:sldId id="262" r:id="rId2"/>
-    <p:sldId id="261" r:id="rId3"/>
-    <p:sldId id="259" r:id="rId4"/>
-    <p:sldId id="260" r:id="rId5"/>
+    <p:sldId id="263" r:id="rId2"/>
+    <p:sldId id="264" r:id="rId3"/>
+    <p:sldId id="262" r:id="rId4"/>
+    <p:sldId id="261" r:id="rId5"/>
+    <p:sldId id="259" r:id="rId6"/>
+    <p:sldId id="260" r:id="rId7"/>
   </p:sldIdLst>
   <p:sldSz cx="9144000" cy="6858000" type="screen4x3"/>
-  <p:notesSz cx="6858000" cy="9144000"/>
+  <p:notesSz cx="7010400" cy="9296400"/>
   <p:defaultTextStyle>
     <a:defPPr>
       <a:defRPr lang="en-US"/>
@@ -148,14 +150,14 @@
         <p:spPr>
           <a:xfrm>
             <a:off x="0" y="0"/>
-            <a:ext cx="2971800" cy="457200"/>
+            <a:ext cx="3037840" cy="464820"/>
           </a:xfrm>
           <a:prstGeom prst="rect">
             <a:avLst/>
           </a:prstGeom>
         </p:spPr>
         <p:txBody>
-          <a:bodyPr vert="horz" lIns="91440" tIns="45720" rIns="91440" bIns="45720" rtlCol="0"/>
+          <a:bodyPr vert="horz" lIns="93177" tIns="46589" rIns="93177" bIns="46589" rtlCol="0"/>
           <a:lstStyle>
             <a:lvl1pPr algn="l">
               <a:defRPr sz="1200"/>
@@ -178,15 +180,15 @@
         </p:nvSpPr>
         <p:spPr>
           <a:xfrm>
-            <a:off x="3884613" y="0"/>
-            <a:ext cx="2971800" cy="457200"/>
+            <a:off x="3970938" y="0"/>
+            <a:ext cx="3037840" cy="464820"/>
           </a:xfrm>
           <a:prstGeom prst="rect">
             <a:avLst/>
           </a:prstGeom>
         </p:spPr>
         <p:txBody>
-          <a:bodyPr vert="horz" lIns="91440" tIns="45720" rIns="91440" bIns="45720" rtlCol="0"/>
+          <a:bodyPr vert="horz" lIns="93177" tIns="46589" rIns="93177" bIns="46589" rtlCol="0"/>
           <a:lstStyle>
             <a:lvl1pPr algn="r">
               <a:defRPr sz="1200"/>
@@ -195,7 +197,7 @@
           <a:p>
             <a:fld id="{DA509331-F808-4279-83E8-ECAE118ADFB6}" type="datetimeFigureOut">
               <a:rPr lang="en-US" smtClean="0"/>
-              <a:t>8/22/2011</a:t>
+              <a:t>8/24/2011</a:t>
             </a:fld>
             <a:endParaRPr lang="en-US"/>
           </a:p>
@@ -213,8 +215,8 @@
         </p:nvSpPr>
         <p:spPr>
           <a:xfrm>
-            <a:off x="1143000" y="685800"/>
-            <a:ext cx="4572000" cy="3429000"/>
+            <a:off x="1181100" y="696913"/>
+            <a:ext cx="4648200" cy="3486150"/>
           </a:xfrm>
           <a:prstGeom prst="rect">
             <a:avLst/>
@@ -227,7 +229,7 @@
           </a:ln>
         </p:spPr>
         <p:txBody>
-          <a:bodyPr vert="horz" lIns="91440" tIns="45720" rIns="91440" bIns="45720" rtlCol="0" anchor="ctr"/>
+          <a:bodyPr vert="horz" lIns="93177" tIns="46589" rIns="93177" bIns="46589" rtlCol="0" anchor="ctr"/>
           <a:lstStyle/>
           <a:p>
             <a:endParaRPr lang="en-US"/>
@@ -246,15 +248,15 @@
         </p:nvSpPr>
         <p:spPr>
           <a:xfrm>
-            <a:off x="685800" y="4343400"/>
-            <a:ext cx="5486400" cy="4114800"/>
+            <a:off x="701040" y="4415790"/>
+            <a:ext cx="5608320" cy="4183380"/>
           </a:xfrm>
           <a:prstGeom prst="rect">
             <a:avLst/>
           </a:prstGeom>
         </p:spPr>
         <p:txBody>
-          <a:bodyPr vert="horz" lIns="91440" tIns="45720" rIns="91440" bIns="45720" rtlCol="0"/>
+          <a:bodyPr vert="horz" lIns="93177" tIns="46589" rIns="93177" bIns="46589" rtlCol="0"/>
           <a:lstStyle/>
           <a:p>
             <a:pPr lvl="0"/>
@@ -306,15 +308,15 @@
         </p:nvSpPr>
         <p:spPr>
           <a:xfrm>
-            <a:off x="0" y="8685213"/>
-            <a:ext cx="2971800" cy="457200"/>
+            <a:off x="0" y="8829967"/>
+            <a:ext cx="3037840" cy="464820"/>
           </a:xfrm>
           <a:prstGeom prst="rect">
             <a:avLst/>
           </a:prstGeom>
         </p:spPr>
         <p:txBody>
-          <a:bodyPr vert="horz" lIns="91440" tIns="45720" rIns="91440" bIns="45720" rtlCol="0" anchor="b"/>
+          <a:bodyPr vert="horz" lIns="93177" tIns="46589" rIns="93177" bIns="46589" rtlCol="0" anchor="b"/>
           <a:lstStyle>
             <a:lvl1pPr algn="l">
               <a:defRPr sz="1200"/>
@@ -337,15 +339,15 @@
         </p:nvSpPr>
         <p:spPr>
           <a:xfrm>
-            <a:off x="3884613" y="8685213"/>
-            <a:ext cx="2971800" cy="457200"/>
+            <a:off x="3970938" y="8829967"/>
+            <a:ext cx="3037840" cy="464820"/>
           </a:xfrm>
           <a:prstGeom prst="rect">
             <a:avLst/>
           </a:prstGeom>
         </p:spPr>
         <p:txBody>
-          <a:bodyPr vert="horz" lIns="91440" tIns="45720" rIns="91440" bIns="45720" rtlCol="0" anchor="b"/>
+          <a:bodyPr vert="horz" lIns="93177" tIns="46589" rIns="93177" bIns="46589" rtlCol="0" anchor="b"/>
           <a:lstStyle>
             <a:lvl1pPr algn="r">
               <a:defRPr sz="1200"/>
@@ -513,7 +515,7 @@
             </a:r>
           </a:p>
           <a:p>
-            <a:pPr marL="628650" lvl="1" indent="-171450">
+            <a:pPr marL="640594" lvl="1" indent="-174708">
               <a:buFont typeface="Arial" pitchFamily="34" charset="0"/>
               <a:buChar char="•"/>
             </a:pPr>
@@ -527,7 +529,7 @@
             </a:r>
           </a:p>
           <a:p>
-            <a:pPr marL="1085850" lvl="2" indent="-171450">
+            <a:pPr marL="1106481" lvl="2" indent="-174708">
               <a:buFont typeface="Arial" pitchFamily="34" charset="0"/>
               <a:buChar char="•"/>
             </a:pPr>
@@ -537,7 +539,7 @@
             </a:r>
           </a:p>
           <a:p>
-            <a:pPr marL="628650" lvl="1" indent="-171450">
+            <a:pPr marL="640594" lvl="1" indent="-174708">
               <a:buFont typeface="Arial" pitchFamily="34" charset="0"/>
               <a:buChar char="•"/>
             </a:pPr>
@@ -551,7 +553,7 @@
             </a:r>
           </a:p>
           <a:p>
-            <a:pPr marL="1085850" lvl="2" indent="-171450">
+            <a:pPr marL="1106481" lvl="2" indent="-174708">
               <a:buFont typeface="Arial" pitchFamily="34" charset="0"/>
               <a:buChar char="•"/>
             </a:pPr>
@@ -574,7 +576,7 @@
             <a:endParaRPr lang="en-US" baseline="0" dirty="0" smtClean="0"/>
           </a:p>
           <a:p>
-            <a:pPr marL="1543050" lvl="3" indent="-171450">
+            <a:pPr marL="1572368" lvl="3" indent="-174708">
               <a:buFont typeface="Arial" pitchFamily="34" charset="0"/>
               <a:buChar char="•"/>
             </a:pPr>
@@ -584,7 +586,7 @@
             </a:r>
           </a:p>
           <a:p>
-            <a:pPr marL="1543050" lvl="3" indent="-171450">
+            <a:pPr marL="1572368" lvl="3" indent="-174708">
               <a:buFont typeface="Arial" pitchFamily="34" charset="0"/>
               <a:buChar char="•"/>
             </a:pPr>
@@ -594,7 +596,7 @@
             </a:r>
           </a:p>
           <a:p>
-            <a:pPr marL="1543050" lvl="3" indent="-171450">
+            <a:pPr marL="1572368" lvl="3" indent="-174708">
               <a:buFont typeface="Arial" pitchFamily="34" charset="0"/>
               <a:buChar char="•"/>
             </a:pPr>
@@ -604,7 +606,7 @@
             </a:r>
           </a:p>
           <a:p>
-            <a:pPr marL="1543050" lvl="3" indent="-171450">
+            <a:pPr marL="1572368" lvl="3" indent="-174708">
               <a:buFont typeface="Arial" pitchFamily="34" charset="0"/>
               <a:buChar char="•"/>
             </a:pPr>
@@ -614,7 +616,7 @@
             </a:r>
           </a:p>
           <a:p>
-            <a:pPr marL="2000250" lvl="4" indent="-171450">
+            <a:pPr marL="2038255" lvl="4" indent="-174708">
               <a:buFont typeface="Arial" pitchFamily="34" charset="0"/>
               <a:buChar char="•"/>
             </a:pPr>
@@ -629,7 +631,7 @@
             <a:endParaRPr lang="en-US" baseline="0" dirty="0" smtClean="0"/>
           </a:p>
           <a:p>
-            <a:pPr marL="2000250" lvl="4" indent="-171450">
+            <a:pPr marL="2038255" lvl="4" indent="-174708">
               <a:buFont typeface="Arial" pitchFamily="34" charset="0"/>
               <a:buChar char="•"/>
             </a:pPr>
@@ -647,7 +649,7 @@
             </a:r>
           </a:p>
           <a:p>
-            <a:pPr marL="2000250" lvl="4" indent="-171450">
+            <a:pPr marL="2038255" lvl="4" indent="-174708">
               <a:buFont typeface="Arial" pitchFamily="34" charset="0"/>
               <a:buChar char="•"/>
             </a:pPr>
@@ -657,7 +659,7 @@
             </a:r>
           </a:p>
           <a:p>
-            <a:pPr marL="2000250" lvl="4" indent="-171450">
+            <a:pPr marL="2038255" lvl="4" indent="-174708">
               <a:buFont typeface="Arial" pitchFamily="34" charset="0"/>
               <a:buChar char="•"/>
             </a:pPr>
@@ -667,7 +669,7 @@
             </a:r>
           </a:p>
           <a:p>
-            <a:pPr marL="2000250" lvl="4" indent="-171450">
+            <a:pPr marL="2038255" lvl="4" indent="-174708">
               <a:buFont typeface="Arial" pitchFamily="34" charset="0"/>
               <a:buChar char="•"/>
             </a:pPr>
@@ -680,12 +682,12 @@
               <a:t>js</a:t>
             </a:r>
             <a:r>
-              <a:rPr lang="en-US" baseline="0" smtClean="0"/>
+              <a:rPr lang="en-US" baseline="0" dirty="0" smtClean="0"/>
               <a:t> frameworks</a:t>
             </a:r>
           </a:p>
           <a:p>
-            <a:pPr marL="2000250" lvl="4" indent="-171450">
+            <a:pPr marL="2038255" lvl="4" indent="-174708">
               <a:buFont typeface="Arial" pitchFamily="34" charset="0"/>
               <a:buChar char="•"/>
             </a:pPr>
@@ -694,15 +696,11 @@
           <a:p>
             <a:r>
               <a:rPr lang="en-US" dirty="0" smtClean="0"/>
-              <a:t>Ely </a:t>
-            </a:r>
-            <a:r>
-              <a:rPr lang="en-US" dirty="0" smtClean="0"/>
-              <a:t>- Package Management</a:t>
-            </a:r>
-          </a:p>
-          <a:p>
-            <a:pPr marL="628650" lvl="1" indent="-171450">
+              <a:t>Ely - Package Management</a:t>
+            </a:r>
+          </a:p>
+          <a:p>
+            <a:pPr marL="640594" lvl="1" indent="-174708">
               <a:buFont typeface="Arial" pitchFamily="34" charset="0"/>
               <a:buChar char="•"/>
             </a:pPr>
@@ -716,7 +714,7 @@
             </a:r>
           </a:p>
           <a:p>
-            <a:pPr marL="628650" lvl="1" indent="-171450">
+            <a:pPr marL="640594" lvl="1" indent="-174708">
               <a:buFont typeface="Arial" pitchFamily="34" charset="0"/>
               <a:buChar char="•"/>
             </a:pPr>
@@ -738,7 +736,7 @@
             </a:r>
           </a:p>
           <a:p>
-            <a:pPr marL="628650" lvl="1" indent="-171450">
+            <a:pPr marL="640594" lvl="1" indent="-174708">
               <a:buFont typeface="Arial" pitchFamily="34" charset="0"/>
               <a:buChar char="•"/>
             </a:pPr>
@@ -748,7 +746,7 @@
             </a:r>
           </a:p>
           <a:p>
-            <a:pPr marL="628650" lvl="1" indent="-171450">
+            <a:pPr marL="640594" lvl="1" indent="-174708">
               <a:buFont typeface="Arial" pitchFamily="34" charset="0"/>
               <a:buChar char="•"/>
             </a:pPr>
@@ -766,24 +764,20 @@
             </a:r>
           </a:p>
           <a:p>
-            <a:pPr marL="171450" indent="-171450">
+            <a:pPr marL="174708" indent="-174708">
               <a:buFont typeface="Arial" pitchFamily="34" charset="0"/>
               <a:buChar char="•"/>
             </a:pPr>
             <a:endParaRPr lang="en-US" baseline="0" dirty="0" smtClean="0"/>
           </a:p>
           <a:p>
-            <a:pPr marL="0" indent="0">
-              <a:buFont typeface="Arial" pitchFamily="34" charset="0"/>
-              <a:buNone/>
-            </a:pPr>
             <a:r>
               <a:rPr lang="en-US" baseline="0" dirty="0" smtClean="0"/>
               <a:t>Ely - Scaffolding</a:t>
             </a:r>
           </a:p>
           <a:p>
-            <a:pPr marL="628650" lvl="1" indent="-171450">
+            <a:pPr marL="640594" lvl="1" indent="-174708">
               <a:buFont typeface="Arial" pitchFamily="34" charset="0"/>
               <a:buChar char="•"/>
             </a:pPr>
@@ -793,7 +787,7 @@
             </a:r>
           </a:p>
           <a:p>
-            <a:pPr marL="628650" lvl="1" indent="-171450">
+            <a:pPr marL="640594" lvl="1" indent="-174708">
               <a:buFont typeface="Arial" pitchFamily="34" charset="0"/>
               <a:buChar char="•"/>
             </a:pPr>
@@ -803,7 +797,7 @@
             </a:r>
           </a:p>
           <a:p>
-            <a:pPr marL="1085850" lvl="2" indent="-171450">
+            <a:pPr marL="1106481" lvl="2" indent="-174708">
               <a:buFont typeface="Arial" pitchFamily="34" charset="0"/>
               <a:buChar char="•"/>
             </a:pPr>
@@ -813,21 +807,9 @@
             </a:r>
           </a:p>
           <a:p>
-            <a:pPr marL="1085850" marR="0" lvl="2" indent="-171450" algn="l" defTabSz="914400" rtl="0" eaLnBrk="1" fontAlgn="auto" latinLnBrk="0" hangingPunct="1">
-              <a:lnSpc>
-                <a:spcPct val="100000"/>
-              </a:lnSpc>
-              <a:spcBef>
-                <a:spcPts val="0"/>
-              </a:spcBef>
-              <a:spcAft>
-                <a:spcPts val="0"/>
-              </a:spcAft>
-              <a:buClrTx/>
-              <a:buSzTx/>
+            <a:pPr marL="1106481" lvl="2" indent="-174708" defTabSz="931774">
               <a:buFont typeface="Arial" pitchFamily="34" charset="0"/>
               <a:buChar char="•"/>
-              <a:tabLst/>
               <a:defRPr/>
             </a:pPr>
             <a:r>
@@ -836,7 +818,7 @@
             </a:r>
           </a:p>
           <a:p>
-            <a:pPr marL="1085850" lvl="2" indent="-171450">
+            <a:pPr marL="1106481" lvl="2" indent="-174708">
               <a:buFont typeface="Arial" pitchFamily="34" charset="0"/>
               <a:buChar char="•"/>
             </a:pPr>
@@ -846,24 +828,20 @@
             </a:r>
           </a:p>
           <a:p>
-            <a:pPr marL="1085850" lvl="2" indent="-171450">
+            <a:pPr marL="1106481" lvl="2" indent="-174708">
               <a:buFont typeface="Arial" pitchFamily="34" charset="0"/>
               <a:buChar char="•"/>
             </a:pPr>
             <a:endParaRPr lang="en-US" baseline="0" dirty="0" smtClean="0"/>
           </a:p>
           <a:p>
-            <a:pPr marL="0" lvl="0" indent="0">
-              <a:buFont typeface="Arial" pitchFamily="34" charset="0"/>
-              <a:buNone/>
-            </a:pPr>
             <a:r>
               <a:rPr lang="en-US" baseline="0" dirty="0" smtClean="0"/>
               <a:t>Ely - View Template Engine</a:t>
             </a:r>
           </a:p>
           <a:p>
-            <a:pPr marL="628650" lvl="1" indent="-171450">
+            <a:pPr marL="640594" lvl="1" indent="-174708">
               <a:buFont typeface="Arial" pitchFamily="34" charset="0"/>
               <a:buChar char="•"/>
             </a:pPr>
@@ -873,7 +851,7 @@
             </a:r>
           </a:p>
           <a:p>
-            <a:pPr marL="628650" lvl="1" indent="-171450">
+            <a:pPr marL="640594" lvl="1" indent="-174708">
               <a:buFont typeface="Arial" pitchFamily="34" charset="0"/>
               <a:buChar char="•"/>
             </a:pPr>
@@ -883,7 +861,7 @@
             </a:r>
           </a:p>
           <a:p>
-            <a:pPr marL="628650" lvl="1" indent="-171450">
+            <a:pPr marL="640594" lvl="1" indent="-174708">
               <a:buFont typeface="Arial" pitchFamily="34" charset="0"/>
               <a:buChar char="•"/>
             </a:pPr>
@@ -893,38 +871,22 @@
             </a:r>
           </a:p>
           <a:p>
-            <a:pPr marL="628650" lvl="1" indent="-171450">
+            <a:pPr marL="640594" lvl="1" indent="-174708">
               <a:buFont typeface="Arial" pitchFamily="34" charset="0"/>
               <a:buChar char="•"/>
             </a:pPr>
             <a:endParaRPr lang="en-US" baseline="0" dirty="0" smtClean="0"/>
           </a:p>
           <a:p>
-            <a:pPr marL="0" lvl="0" indent="0">
-              <a:buFont typeface="Arial" pitchFamily="34" charset="0"/>
-              <a:buNone/>
-            </a:pPr>
             <a:r>
               <a:rPr lang="en-US" baseline="0" dirty="0" smtClean="0"/>
               <a:t>Joe - JavaScript Integration</a:t>
             </a:r>
           </a:p>
           <a:p>
-            <a:pPr marL="628650" marR="0" lvl="1" indent="-171450" algn="l" defTabSz="914400" rtl="0" eaLnBrk="1" fontAlgn="auto" latinLnBrk="0" hangingPunct="1">
-              <a:lnSpc>
-                <a:spcPct val="100000"/>
-              </a:lnSpc>
-              <a:spcBef>
-                <a:spcPts val="0"/>
-              </a:spcBef>
-              <a:spcAft>
-                <a:spcPts val="0"/>
-              </a:spcAft>
-              <a:buClrTx/>
-              <a:buSzTx/>
+            <a:pPr marL="640594" lvl="1" indent="-174708" defTabSz="931774">
               <a:buFont typeface="Arial" pitchFamily="34" charset="0"/>
               <a:buChar char="•"/>
-              <a:tabLst/>
               <a:defRPr/>
             </a:pPr>
             <a:r>
@@ -953,7 +915,7 @@
             </a:r>
           </a:p>
           <a:p>
-            <a:pPr marL="628650" lvl="1" indent="-171450">
+            <a:pPr marL="640594" lvl="1" indent="-174708">
               <a:buFont typeface="Arial" pitchFamily="34" charset="0"/>
               <a:buChar char="•"/>
             </a:pPr>
@@ -979,7 +941,7 @@
             </a:r>
           </a:p>
           <a:p>
-            <a:pPr marL="628650" lvl="1" indent="-171450">
+            <a:pPr marL="640594" lvl="1" indent="-174708">
               <a:buFont typeface="Arial" pitchFamily="34" charset="0"/>
               <a:buChar char="•"/>
             </a:pPr>
@@ -993,7 +955,7 @@
             </a:r>
           </a:p>
           <a:p>
-            <a:pPr marL="628650" lvl="1" indent="-171450">
+            <a:pPr marL="640594" lvl="1" indent="-174708">
               <a:buFont typeface="Arial" pitchFamily="34" charset="0"/>
               <a:buChar char="•"/>
             </a:pPr>
@@ -1003,24 +965,20 @@
             </a:r>
           </a:p>
           <a:p>
-            <a:pPr marL="628650" lvl="1" indent="-171450">
+            <a:pPr marL="640594" lvl="1" indent="-174708">
               <a:buFont typeface="Arial" pitchFamily="34" charset="0"/>
               <a:buChar char="•"/>
             </a:pPr>
             <a:endParaRPr lang="en-US" baseline="0" dirty="0" smtClean="0"/>
           </a:p>
           <a:p>
-            <a:pPr marL="0" lvl="0" indent="0">
-              <a:buFont typeface="Arial" pitchFamily="34" charset="0"/>
-              <a:buNone/>
-            </a:pPr>
             <a:r>
               <a:rPr lang="en-US" baseline="0" dirty="0" smtClean="0"/>
               <a:t>Joe - Validation</a:t>
             </a:r>
           </a:p>
           <a:p>
-            <a:pPr marL="628650" lvl="1" indent="-171450">
+            <a:pPr marL="640594" lvl="1" indent="-174708">
               <a:buFont typeface="Arial" pitchFamily="34" charset="0"/>
               <a:buChar char="•"/>
             </a:pPr>
@@ -1035,7 +993,7 @@
             <a:endParaRPr lang="en-US" baseline="0" dirty="0" smtClean="0"/>
           </a:p>
           <a:p>
-            <a:pPr marL="628650" lvl="1" indent="-171450">
+            <a:pPr marL="640594" lvl="1" indent="-174708">
               <a:buFont typeface="Arial" pitchFamily="34" charset="0"/>
               <a:buChar char="•"/>
             </a:pPr>
@@ -1058,7 +1016,7 @@
             <a:endParaRPr lang="en-US" baseline="0" dirty="0" smtClean="0"/>
           </a:p>
           <a:p>
-            <a:pPr marL="628650" lvl="1" indent="-171450">
+            <a:pPr marL="640594" lvl="1" indent="-174708">
               <a:buFont typeface="Arial" pitchFamily="34" charset="0"/>
               <a:buChar char="•"/>
             </a:pPr>
@@ -1076,7 +1034,7 @@
             </a:r>
           </a:p>
           <a:p>
-            <a:pPr marL="628650" lvl="1" indent="-171450">
+            <a:pPr marL="640594" lvl="1" indent="-174708">
               <a:buFont typeface="Arial" pitchFamily="34" charset="0"/>
               <a:buChar char="•"/>
             </a:pPr>
@@ -1086,7 +1044,7 @@
             </a:r>
           </a:p>
           <a:p>
-            <a:pPr marL="1085850" lvl="2" indent="-171450">
+            <a:pPr marL="1106481" lvl="2" indent="-174708">
               <a:buFont typeface="Arial" pitchFamily="34" charset="0"/>
               <a:buChar char="•"/>
             </a:pPr>
@@ -1104,7 +1062,7 @@
             </a:r>
           </a:p>
           <a:p>
-            <a:pPr marL="1085850" lvl="2" indent="-171450">
+            <a:pPr marL="1106481" lvl="2" indent="-174708">
               <a:buFont typeface="Arial" pitchFamily="34" charset="0"/>
               <a:buChar char="•"/>
             </a:pPr>
@@ -1114,7 +1072,7 @@
             </a:r>
           </a:p>
           <a:p>
-            <a:pPr marL="1085850" lvl="2" indent="-171450">
+            <a:pPr marL="1106481" lvl="2" indent="-174708">
               <a:buFont typeface="Arial" pitchFamily="34" charset="0"/>
               <a:buChar char="•"/>
             </a:pPr>
@@ -1124,17 +1082,13 @@
             </a:r>
           </a:p>
           <a:p>
-            <a:pPr marL="171450" lvl="0" indent="-171450">
+            <a:pPr marL="174708" indent="-174708">
               <a:buFont typeface="Arial" pitchFamily="34" charset="0"/>
               <a:buChar char="•"/>
             </a:pPr>
             <a:endParaRPr lang="en-US" baseline="0" dirty="0" smtClean="0"/>
           </a:p>
           <a:p>
-            <a:pPr marL="0" lvl="0" indent="0">
-              <a:buFont typeface="Arial" pitchFamily="34" charset="0"/>
-              <a:buNone/>
-            </a:pPr>
             <a:r>
               <a:rPr lang="en-US" baseline="0" dirty="0" smtClean="0"/>
               <a:t>Joe - Resources</a:t>
@@ -1159,7 +1113,7 @@
           <a:p>
             <a:fld id="{E1455EBF-E30D-4A2C-B267-56871E9C40B0}" type="slidenum">
               <a:rPr lang="en-US" smtClean="0"/>
-              <a:t>3</a:t>
+              <a:t>5</a:t>
             </a:fld>
             <a:endParaRPr lang="en-US"/>
           </a:p>
@@ -1431,7 +1385,7 @@
           <a:p>
             <a:fld id="{88E83F91-5838-4900-8916-BB951269D160}" type="datetimeFigureOut">
               <a:rPr lang="en-US" smtClean="0"/>
-              <a:t>8/22/2011</a:t>
+              <a:t>8/24/2011</a:t>
             </a:fld>
             <a:endParaRPr lang="en-US"/>
           </a:p>
@@ -1644,7 +1598,7 @@
           <a:p>
             <a:fld id="{88E83F91-5838-4900-8916-BB951269D160}" type="datetimeFigureOut">
               <a:rPr lang="en-US" smtClean="0"/>
-              <a:t>8/22/2011</a:t>
+              <a:t>8/24/2011</a:t>
             </a:fld>
             <a:endParaRPr lang="en-US"/>
           </a:p>
@@ -1911,7 +1865,7 @@
           <a:p>
             <a:fld id="{88E83F91-5838-4900-8916-BB951269D160}" type="datetimeFigureOut">
               <a:rPr lang="en-US" smtClean="0"/>
-              <a:t>8/22/2011</a:t>
+              <a:t>8/24/2011</a:t>
             </a:fld>
             <a:endParaRPr lang="en-US"/>
           </a:p>
@@ -2061,7 +2015,7 @@
           <a:p>
             <a:fld id="{88E83F91-5838-4900-8916-BB951269D160}" type="datetimeFigureOut">
               <a:rPr lang="en-US" smtClean="0"/>
-              <a:t>8/22/2011</a:t>
+              <a:t>8/24/2011</a:t>
             </a:fld>
             <a:endParaRPr lang="en-US"/>
           </a:p>
@@ -2391,7 +2345,7 @@
           <a:p>
             <a:fld id="{88E83F91-5838-4900-8916-BB951269D160}" type="datetimeFigureOut">
               <a:rPr lang="en-US" smtClean="0"/>
-              <a:t>8/22/2011</a:t>
+              <a:t>8/24/2011</a:t>
             </a:fld>
             <a:endParaRPr lang="en-US"/>
           </a:p>
@@ -2699,7 +2653,7 @@
           <a:p>
             <a:fld id="{88E83F91-5838-4900-8916-BB951269D160}" type="datetimeFigureOut">
               <a:rPr lang="en-US" smtClean="0"/>
-              <a:t>8/22/2011</a:t>
+              <a:t>8/24/2011</a:t>
             </a:fld>
             <a:endParaRPr lang="en-US"/>
           </a:p>
@@ -3120,7 +3074,7 @@
           <a:p>
             <a:fld id="{88E83F91-5838-4900-8916-BB951269D160}" type="datetimeFigureOut">
               <a:rPr lang="en-US" smtClean="0"/>
-              <a:t>8/22/2011</a:t>
+              <a:t>8/24/2011</a:t>
             </a:fld>
             <a:endParaRPr lang="en-US"/>
           </a:p>
@@ -3233,7 +3187,7 @@
           <a:p>
             <a:fld id="{88E83F91-5838-4900-8916-BB951269D160}" type="datetimeFigureOut">
               <a:rPr lang="en-US" smtClean="0"/>
-              <a:t>8/22/2011</a:t>
+              <a:t>8/24/2011</a:t>
             </a:fld>
             <a:endParaRPr lang="en-US"/>
           </a:p>
@@ -3392,7 +3346,7 @@
           <a:p>
             <a:fld id="{88E83F91-5838-4900-8916-BB951269D160}" type="datetimeFigureOut">
               <a:rPr lang="en-US" smtClean="0"/>
-              <a:t>8/22/2011</a:t>
+              <a:t>8/24/2011</a:t>
             </a:fld>
             <a:endParaRPr lang="en-US"/>
           </a:p>
@@ -3776,7 +3730,7 @@
           <a:p>
             <a:fld id="{88E83F91-5838-4900-8916-BB951269D160}" type="datetimeFigureOut">
               <a:rPr lang="en-US" smtClean="0"/>
-              <a:t>8/22/2011</a:t>
+              <a:t>8/24/2011</a:t>
             </a:fld>
             <a:endParaRPr lang="en-US"/>
           </a:p>
@@ -4138,7 +4092,7 @@
           <a:p>
             <a:fld id="{88E83F91-5838-4900-8916-BB951269D160}" type="datetimeFigureOut">
               <a:rPr lang="en-US" smtClean="0"/>
-              <a:t>8/22/2011</a:t>
+              <a:t>8/24/2011</a:t>
             </a:fld>
             <a:endParaRPr lang="en-US"/>
           </a:p>
@@ -4472,7 +4426,7 @@
           <a:p>
             <a:fld id="{88E83F91-5838-4900-8916-BB951269D160}" type="datetimeFigureOut">
               <a:rPr lang="en-US" smtClean="0"/>
-              <a:t>8/22/2011</a:t>
+              <a:t>8/24/2011</a:t>
             </a:fld>
             <a:endParaRPr lang="en-US"/>
           </a:p>
@@ -4856,6 +4810,125 @@
 </file>
 
 <file path=ppt/slides/slide1.xml><?xml version="1.0" encoding="utf-8"?>
+<p:sld xmlns:a="http://schemas.openxmlformats.org/drawingml/2006/main" xmlns:r="http://schemas.openxmlformats.org/officeDocument/2006/relationships" xmlns:p="http://schemas.openxmlformats.org/presentationml/2006/main" showMasterSp="0">
+  <p:cSld>
+    <p:spTree>
+      <p:nvGrpSpPr>
+        <p:cNvPr id="1" name=""/>
+        <p:cNvGrpSpPr/>
+        <p:nvPr/>
+      </p:nvGrpSpPr>
+      <p:grpSpPr>
+        <a:xfrm>
+          <a:off x="0" y="0"/>
+          <a:ext cx="0" cy="0"/>
+          <a:chOff x="0" y="0"/>
+          <a:chExt cx="0" cy="0"/>
+        </a:xfrm>
+      </p:grpSpPr>
+      <p:pic>
+        <p:nvPicPr>
+          <p:cNvPr id="4" name="Content Placeholder 3"/>
+          <p:cNvPicPr>
+            <a:picLocks noGrp="1" noChangeAspect="1"/>
+          </p:cNvPicPr>
+          <p:nvPr>
+            <p:ph idx="1"/>
+          </p:nvPr>
+        </p:nvPicPr>
+        <p:blipFill>
+          <a:blip r:embed="rId2">
+            <a:extLst>
+              <a:ext uri="{28A0092B-C50C-407E-A947-70E740481C1C}">
+                <a14:useLocalDpi xmlns:a14="http://schemas.microsoft.com/office/drawing/2010/main" val="0"/>
+              </a:ext>
+            </a:extLst>
+          </a:blip>
+          <a:stretch>
+            <a:fillRect/>
+          </a:stretch>
+        </p:blipFill>
+        <p:spPr>
+          <a:xfrm>
+            <a:off x="1600200" y="134873"/>
+            <a:ext cx="5943600" cy="6646927"/>
+          </a:xfrm>
+        </p:spPr>
+      </p:pic>
+    </p:spTree>
+    <p:extLst>
+      <p:ext uri="{BB962C8B-B14F-4D97-AF65-F5344CB8AC3E}">
+        <p14:creationId xmlns:p14="http://schemas.microsoft.com/office/powerpoint/2010/main" val="3833452537"/>
+      </p:ext>
+    </p:extLst>
+  </p:cSld>
+  <p:clrMapOvr>
+    <a:masterClrMapping/>
+  </p:clrMapOvr>
+</p:sld>
+</file>
+
+<file path=ppt/slides/slide2.xml><?xml version="1.0" encoding="utf-8"?>
+<p:sld xmlns:a="http://schemas.openxmlformats.org/drawingml/2006/main" xmlns:r="http://schemas.openxmlformats.org/officeDocument/2006/relationships" xmlns:p="http://schemas.openxmlformats.org/presentationml/2006/main" showMasterSp="0">
+  <p:cSld>
+    <p:spTree>
+      <p:nvGrpSpPr>
+        <p:cNvPr id="1" name=""/>
+        <p:cNvGrpSpPr/>
+        <p:nvPr/>
+      </p:nvGrpSpPr>
+      <p:grpSpPr>
+        <a:xfrm>
+          <a:off x="0" y="0"/>
+          <a:ext cx="0" cy="0"/>
+          <a:chOff x="0" y="0"/>
+          <a:chExt cx="0" cy="0"/>
+        </a:xfrm>
+      </p:grpSpPr>
+      <p:pic>
+        <p:nvPicPr>
+          <p:cNvPr id="4" name="Picture 3"/>
+          <p:cNvPicPr>
+            <a:picLocks noChangeAspect="1"/>
+          </p:cNvPicPr>
+          <p:nvPr/>
+        </p:nvPicPr>
+        <p:blipFill>
+          <a:blip r:embed="rId2">
+            <a:extLst>
+              <a:ext uri="{28A0092B-C50C-407E-A947-70E740481C1C}">
+                <a14:useLocalDpi xmlns:a14="http://schemas.microsoft.com/office/drawing/2010/main" val="0"/>
+              </a:ext>
+            </a:extLst>
+          </a:blip>
+          <a:stretch>
+            <a:fillRect/>
+          </a:stretch>
+        </p:blipFill>
+        <p:spPr>
+          <a:xfrm>
+            <a:off x="0" y="0"/>
+            <a:ext cx="9144000" cy="6858000"/>
+          </a:xfrm>
+          <a:prstGeom prst="rect">
+            <a:avLst/>
+          </a:prstGeom>
+        </p:spPr>
+      </p:pic>
+    </p:spTree>
+    <p:extLst>
+      <p:ext uri="{BB962C8B-B14F-4D97-AF65-F5344CB8AC3E}">
+        <p14:creationId xmlns:p14="http://schemas.microsoft.com/office/powerpoint/2010/main" val="1178179435"/>
+      </p:ext>
+    </p:extLst>
+  </p:cSld>
+  <p:clrMapOvr>
+    <a:masterClrMapping/>
+  </p:clrMapOvr>
+</p:sld>
+</file>
+
+<file path=ppt/slides/slide3.xml><?xml version="1.0" encoding="utf-8"?>
 <p:sld xmlns:a="http://schemas.openxmlformats.org/drawingml/2006/main" xmlns:r="http://schemas.openxmlformats.org/officeDocument/2006/relationships" xmlns:p="http://schemas.openxmlformats.org/presentationml/2006/main">
   <p:cSld>
     <p:spTree>
@@ -4942,7 +5015,7 @@
 </p:sld>
 </file>
 
-<file path=ppt/slides/slide2.xml><?xml version="1.0" encoding="utf-8"?>
+<file path=ppt/slides/slide4.xml><?xml version="1.0" encoding="utf-8"?>
 <p:sld xmlns:a="http://schemas.openxmlformats.org/drawingml/2006/main" xmlns:r="http://schemas.openxmlformats.org/officeDocument/2006/relationships" xmlns:p="http://schemas.openxmlformats.org/presentationml/2006/main">
   <p:cSld>
     <p:spTree>
@@ -5127,7 +5200,7 @@
 </p:sld>
 </file>
 
-<file path=ppt/slides/slide3.xml><?xml version="1.0" encoding="utf-8"?>
+<file path=ppt/slides/slide5.xml><?xml version="1.0" encoding="utf-8"?>
 <p:sld xmlns:a="http://schemas.openxmlformats.org/drawingml/2006/main" xmlns:r="http://schemas.openxmlformats.org/officeDocument/2006/relationships" xmlns:p="http://schemas.openxmlformats.org/presentationml/2006/main">
   <p:cSld>
     <p:spTree>
@@ -5164,11 +5237,7 @@
             <a:pPr marL="400050" indent="-342900"/>
             <a:r>
               <a:rPr lang="en-US" sz="3200" dirty="0" smtClean="0"/>
-              <a:t>Introduc</a:t>
-            </a:r>
-            <a:r>
-              <a:rPr lang="en-US" sz="3200" dirty="0" smtClean="0"/>
-              <a:t>tion to MVC</a:t>
+              <a:t>Introduction to MVC</a:t>
             </a:r>
           </a:p>
           <a:p>
@@ -5298,7 +5367,7 @@
 </p:sld>
 </file>
 
-<file path=ppt/slides/slide4.xml><?xml version="1.0" encoding="utf-8"?>
+<file path=ppt/slides/slide6.xml><?xml version="1.0" encoding="utf-8"?>
 <p:sld xmlns:a="http://schemas.openxmlformats.org/drawingml/2006/main" xmlns:r="http://schemas.openxmlformats.org/officeDocument/2006/relationships" xmlns:p="http://schemas.openxmlformats.org/presentationml/2006/main">
   <p:cSld>
     <p:spTree>

</xml_diff>